<commit_message>
fixed a bug in the library
library of the wrong user was shown
</commit_message>
<xml_diff>
--- a/ScreenTale/Projektmanagement/Projekt Präsentationen/ScreenTale Zwischenpräsentation _14_02_2024.pptx
+++ b/ScreenTale/Projektmanagement/Projekt Präsentationen/ScreenTale Zwischenpräsentation _14_02_2024.pptx
@@ -5324,19 +5324,19 @@
           <a:lstStyle/>
           <a:p>
             <a:r>
-              <a:rPr lang="de-DE"/>
+              <a:rPr lang="de-DE" dirty="0"/>
               <a:t>Login funktioniert</a:t>
             </a:r>
           </a:p>
           <a:p>
             <a:r>
-              <a:rPr lang="de-DE"/>
+              <a:rPr lang="de-DE" dirty="0"/>
               <a:t>Vorschläge von Bestsellern</a:t>
             </a:r>
           </a:p>
           <a:p>
             <a:r>
-              <a:rPr lang="de-DE"/>
+              <a:rPr lang="de-DE" dirty="0"/>
               <a:t>Suchfunktion für Bücher</a:t>
             </a:r>
           </a:p>
@@ -5348,13 +5348,13 @@
           </a:p>
           <a:p>
             <a:r>
-              <a:rPr lang="de-DE"/>
+              <a:rPr lang="de-DE" dirty="0"/>
               <a:t>Anzeigen der eigenen Bibliothek</a:t>
             </a:r>
             <a:br>
-              <a:rPr lang="de-DE"/>
+              <a:rPr lang="de-DE" dirty="0"/>
             </a:br>
-            <a:endParaRPr lang="de-DE"/>
+            <a:endParaRPr lang="de-DE" dirty="0"/>
           </a:p>
           <a:p>
             <a:pPr marL="0" indent="0">

</xml_diff>